<commit_message>
Consegui passar o bendito do token via json
</commit_message>
<xml_diff>
--- a/doc/Entregas_Desenvolvimento_de_APP/Recruta-Slide v1.3 - Anderson.pptx
+++ b/doc/Entregas_Desenvolvimento_de_APP/Recruta-Slide v1.3 - Anderson.pptx
@@ -4638,7 +4638,7 @@
                 <a:spcPct val="100000"/>
               </a:lnSpc>
             </a:pPr>
-            <a:fld id="{2D4D42F1-7233-4196-80D3-E482C13B6A9A}" type="datetime">
+            <a:fld id="{9EED7CAC-32FF-471A-8F6F-4D78E1E0177D}" type="datetime">
               <a:rPr b="0" lang="pt-BR" sz="1200" spc="-1" strike="noStrike">
                 <a:solidFill>
                   <a:srgbClr val="8b8b8b"/>
@@ -4729,7 +4729,7 @@
                 <a:spcPct val="100000"/>
               </a:lnSpc>
             </a:pPr>
-            <a:fld id="{937F3330-F320-4072-AE08-57A32E750CE2}" type="slidenum">
+            <a:fld id="{0C441339-E50D-4FCA-A44C-B6ECA83B33EC}" type="slidenum">
               <a:rPr b="0" lang="pt-BR" sz="1200" spc="-1" strike="noStrike">
                 <a:solidFill>
                   <a:srgbClr val="8b8b8b"/>
@@ -5998,7 +5998,7 @@
                 <a:spcPct val="100000"/>
               </a:lnSpc>
             </a:pPr>
-            <a:fld id="{4A36483F-8E24-4E5F-A55F-517C485B60A8}" type="datetime">
+            <a:fld id="{14F9E918-C635-4C00-B792-D5AA4DC4387F}" type="datetime">
               <a:rPr b="0" lang="pt-BR" sz="1200" spc="-1" strike="noStrike">
                 <a:solidFill>
                   <a:srgbClr val="8b8b8b"/>
@@ -6089,7 +6089,7 @@
                 <a:spcPct val="100000"/>
               </a:lnSpc>
             </a:pPr>
-            <a:fld id="{4C916B1E-EA9F-4C89-820D-5E9C103309FC}" type="slidenum">
+            <a:fld id="{17C170FF-1452-46E0-BD20-4EA3D34F15A8}" type="slidenum">
               <a:rPr b="0" lang="pt-BR" sz="1200" spc="-1" strike="noStrike">
                 <a:solidFill>
                   <a:srgbClr val="8b8b8b"/>

</xml_diff>